<commit_message>
Fith example almost there
It is awaiting a fix in the IG publisher
</commit_message>
<xml_diff>
--- a/input/images-source/LabExampleE5Business.pptx
+++ b/input/images-source/LabExampleE5Business.pptx
@@ -107,6 +107,11 @@
       </a:defRPr>
     </a:lvl9pPr>
   </p:defaultTextStyle>
+  <p:extLst>
+    <p:ext uri="{EFAFB233-063F-42B5-8137-9DF3F51BA10A}">
+      <p15:sldGuideLst xmlns:p15="http://schemas.microsoft.com/office/powerpoint/2012/main"/>
+    </p:ext>
+  </p:extLst>
 </p:presentation>
 </file>
 
@@ -192,7 +197,7 @@
           <a:p>
             <a:fld id="{3D383E25-ED88-43CC-AA2F-0341AE51D4D3}" type="datetimeFigureOut">
               <a:rPr lang="fr-FR" smtClean="0"/>
-              <a:t>11/02/2020</a:t>
+              <a:t>13/02/2020</a:t>
             </a:fld>
             <a:endParaRPr lang="fr-FR"/>
           </a:p>
@@ -690,7 +695,7 @@
           <a:p>
             <a:fld id="{CDF9A785-7AA9-4C7C-BC55-661482E14A35}" type="datetimeFigureOut">
               <a:rPr lang="fr-FR" smtClean="0"/>
-              <a:t>11/02/2020</a:t>
+              <a:t>13/02/2020</a:t>
             </a:fld>
             <a:endParaRPr lang="fr-FR"/>
           </a:p>
@@ -888,7 +893,7 @@
           <a:p>
             <a:fld id="{CDF9A785-7AA9-4C7C-BC55-661482E14A35}" type="datetimeFigureOut">
               <a:rPr lang="fr-FR" smtClean="0"/>
-              <a:t>11/02/2020</a:t>
+              <a:t>13/02/2020</a:t>
             </a:fld>
             <a:endParaRPr lang="fr-FR"/>
           </a:p>
@@ -1096,7 +1101,7 @@
           <a:p>
             <a:fld id="{CDF9A785-7AA9-4C7C-BC55-661482E14A35}" type="datetimeFigureOut">
               <a:rPr lang="fr-FR" smtClean="0"/>
-              <a:t>11/02/2020</a:t>
+              <a:t>13/02/2020</a:t>
             </a:fld>
             <a:endParaRPr lang="fr-FR"/>
           </a:p>
@@ -1294,7 +1299,7 @@
           <a:p>
             <a:fld id="{CDF9A785-7AA9-4C7C-BC55-661482E14A35}" type="datetimeFigureOut">
               <a:rPr lang="fr-FR" smtClean="0"/>
-              <a:t>11/02/2020</a:t>
+              <a:t>13/02/2020</a:t>
             </a:fld>
             <a:endParaRPr lang="fr-FR"/>
           </a:p>
@@ -1569,7 +1574,7 @@
           <a:p>
             <a:fld id="{CDF9A785-7AA9-4C7C-BC55-661482E14A35}" type="datetimeFigureOut">
               <a:rPr lang="fr-FR" smtClean="0"/>
-              <a:t>11/02/2020</a:t>
+              <a:t>13/02/2020</a:t>
             </a:fld>
             <a:endParaRPr lang="fr-FR"/>
           </a:p>
@@ -1834,7 +1839,7 @@
           <a:p>
             <a:fld id="{CDF9A785-7AA9-4C7C-BC55-661482E14A35}" type="datetimeFigureOut">
               <a:rPr lang="fr-FR" smtClean="0"/>
-              <a:t>11/02/2020</a:t>
+              <a:t>13/02/2020</a:t>
             </a:fld>
             <a:endParaRPr lang="fr-FR"/>
           </a:p>
@@ -2246,7 +2251,7 @@
           <a:p>
             <a:fld id="{CDF9A785-7AA9-4C7C-BC55-661482E14A35}" type="datetimeFigureOut">
               <a:rPr lang="fr-FR" smtClean="0"/>
-              <a:t>11/02/2020</a:t>
+              <a:t>13/02/2020</a:t>
             </a:fld>
             <a:endParaRPr lang="fr-FR"/>
           </a:p>
@@ -2387,7 +2392,7 @@
           <a:p>
             <a:fld id="{CDF9A785-7AA9-4C7C-BC55-661482E14A35}" type="datetimeFigureOut">
               <a:rPr lang="fr-FR" smtClean="0"/>
-              <a:t>11/02/2020</a:t>
+              <a:t>13/02/2020</a:t>
             </a:fld>
             <a:endParaRPr lang="fr-FR"/>
           </a:p>
@@ -2500,7 +2505,7 @@
           <a:p>
             <a:fld id="{CDF9A785-7AA9-4C7C-BC55-661482E14A35}" type="datetimeFigureOut">
               <a:rPr lang="fr-FR" smtClean="0"/>
-              <a:t>11/02/2020</a:t>
+              <a:t>13/02/2020</a:t>
             </a:fld>
             <a:endParaRPr lang="fr-FR"/>
           </a:p>
@@ -2811,7 +2816,7 @@
           <a:p>
             <a:fld id="{CDF9A785-7AA9-4C7C-BC55-661482E14A35}" type="datetimeFigureOut">
               <a:rPr lang="fr-FR" smtClean="0"/>
-              <a:t>11/02/2020</a:t>
+              <a:t>13/02/2020</a:t>
             </a:fld>
             <a:endParaRPr lang="fr-FR"/>
           </a:p>
@@ -3099,7 +3104,7 @@
           <a:p>
             <a:fld id="{CDF9A785-7AA9-4C7C-BC55-661482E14A35}" type="datetimeFigureOut">
               <a:rPr lang="fr-FR" smtClean="0"/>
-              <a:t>11/02/2020</a:t>
+              <a:t>13/02/2020</a:t>
             </a:fld>
             <a:endParaRPr lang="fr-FR"/>
           </a:p>
@@ -3340,7 +3345,7 @@
           <a:p>
             <a:fld id="{CDF9A785-7AA9-4C7C-BC55-661482E14A35}" type="datetimeFigureOut">
               <a:rPr lang="fr-FR" smtClean="0"/>
-              <a:t>11/02/2020</a:t>
+              <a:t>13/02/2020</a:t>
             </a:fld>
             <a:endParaRPr lang="fr-FR"/>
           </a:p>
@@ -6093,7 +6098,7 @@
         </p:nvSpPr>
         <p:spPr>
           <a:xfrm>
-            <a:off x="7119378" y="4913793"/>
+            <a:off x="8304367" y="4913793"/>
             <a:ext cx="2278907" cy="276999"/>
           </a:xfrm>
           <a:prstGeom prst="rect">
@@ -6118,7 +6123,7 @@
                   </a:schemeClr>
                 </a:solidFill>
               </a:rPr>
-              <a:t>output observations</a:t>
+              <a:t>output observation</a:t>
             </a:r>
           </a:p>
         </p:txBody>
@@ -6316,6 +6321,50 @@
           </a:fontRef>
         </p:style>
       </p:cxnSp>
+      <p:sp>
+        <p:nvSpPr>
+          <p:cNvPr id="50" name="ZoneTexte 49">
+            <a:extLst>
+              <a:ext uri="{FF2B5EF4-FFF2-40B4-BE49-F238E27FC236}">
+                <a16:creationId xmlns:a16="http://schemas.microsoft.com/office/drawing/2014/main" id="{46140CF4-A96B-423F-AF0A-B6B49E552475}"/>
+              </a:ext>
+            </a:extLst>
+          </p:cNvPr>
+          <p:cNvSpPr txBox="1"/>
+          <p:nvPr/>
+        </p:nvSpPr>
+        <p:spPr>
+          <a:xfrm>
+            <a:off x="5246517" y="4561059"/>
+            <a:ext cx="2278907" cy="276999"/>
+          </a:xfrm>
+          <a:prstGeom prst="rect">
+            <a:avLst/>
+          </a:prstGeom>
+          <a:solidFill>
+            <a:schemeClr val="bg1"/>
+          </a:solidFill>
+        </p:spPr>
+        <p:txBody>
+          <a:bodyPr wrap="square" tIns="0" bIns="0" rtlCol="0">
+            <a:spAutoFit/>
+          </a:bodyPr>
+          <a:lstStyle/>
+          <a:p>
+            <a:pPr algn="ctr"/>
+            <a:r>
+              <a:rPr lang="en-US" dirty="0">
+                <a:solidFill>
+                  <a:schemeClr val="accent6">
+                    <a:lumMod val="75000"/>
+                  </a:schemeClr>
+                </a:solidFill>
+              </a:rPr>
+              <a:t>output observation</a:t>
+            </a:r>
+          </a:p>
+        </p:txBody>
+      </p:sp>
     </p:spTree>
     <p:extLst>
       <p:ext uri="{BB962C8B-B14F-4D97-AF65-F5344CB8AC3E}">

</xml_diff>